<commit_message>
ihab pass on intro
</commit_message>
<xml_diff>
--- a/arch3.pptx
+++ b/arch3.pptx
@@ -2969,16 +2969,53 @@
           <a:chExt cx="0" cy="0"/>
         </a:xfrm>
       </p:grpSpPr>
-      <p:sp>
-        <p:nvSpPr>
-          <p:cNvPr id="73" name="Down Arrow 72"/>
+      <p:cxnSp>
+        <p:nvCxnSpPr>
+          <p:cNvPr id="20" name="Straight Connector 19"/>
+          <p:cNvCxnSpPr/>
+          <p:nvPr/>
+        </p:nvCxnSpPr>
+        <p:spPr>
+          <a:xfrm flipV="1">
+            <a:off x="900018" y="3017209"/>
+            <a:ext cx="11370365" cy="19878"/>
+          </a:xfrm>
+          <a:prstGeom prst="line">
+            <a:avLst/>
+          </a:prstGeom>
+          <a:ln w="38100">
+            <a:solidFill>
+              <a:schemeClr val="tx1"/>
+            </a:solidFill>
+            <a:prstDash val="dash"/>
+            <a:tailEnd type="triangle"/>
+          </a:ln>
+        </p:spPr>
+        <p:style>
+          <a:lnRef idx="1">
+            <a:schemeClr val="accent1"/>
+          </a:lnRef>
+          <a:fillRef idx="0">
+            <a:schemeClr val="accent1"/>
+          </a:fillRef>
+          <a:effectRef idx="0">
+            <a:schemeClr val="accent1"/>
+          </a:effectRef>
+          <a:fontRef idx="minor">
+            <a:schemeClr val="tx1"/>
+          </a:fontRef>
+        </p:style>
+      </p:cxnSp>
+      <p:sp>
+        <p:nvSpPr>
+          <p:cNvPr id="65" name="Down Arrow 64"/>
           <p:cNvSpPr/>
           <p:nvPr/>
         </p:nvSpPr>
         <p:spPr>
           <a:xfrm rot="10800000">
-            <a:off x="9155026" y="758883"/>
-            <a:ext cx="304530" cy="2980780"/>
+            <a:off x="7879570" y="753949"/>
+            <a:ext cx="371846" cy="393252"/>
           </a:xfrm>
           <a:prstGeom prst="downArrow">
             <a:avLst/>
@@ -3019,102 +3056,6 @@
       </p:sp>
       <p:sp>
         <p:nvSpPr>
-          <p:cNvPr id="72" name="Down Arrow 71"/>
-          <p:cNvSpPr/>
-          <p:nvPr/>
-        </p:nvSpPr>
-        <p:spPr>
-          <a:xfrm rot="10800000">
-            <a:off x="8633010" y="1772328"/>
-            <a:ext cx="251141" cy="1735867"/>
-          </a:xfrm>
-          <a:prstGeom prst="downArrow">
-            <a:avLst/>
-          </a:prstGeom>
-          <a:solidFill>
-            <a:srgbClr val="002060"/>
-          </a:solidFill>
-          <a:ln>
-            <a:solidFill>
-              <a:srgbClr val="0070C0"/>
-            </a:solidFill>
-          </a:ln>
-        </p:spPr>
-        <p:style>
-          <a:lnRef idx="2">
-            <a:schemeClr val="accent1">
-              <a:shade val="50000"/>
-            </a:schemeClr>
-          </a:lnRef>
-          <a:fillRef idx="1">
-            <a:schemeClr val="accent1"/>
-          </a:fillRef>
-          <a:effectRef idx="0">
-            <a:schemeClr val="accent1"/>
-          </a:effectRef>
-          <a:fontRef idx="minor">
-            <a:schemeClr val="lt1"/>
-          </a:fontRef>
-        </p:style>
-        <p:txBody>
-          <a:bodyPr rtlCol="0" anchor="ctr"/>
-          <a:lstStyle/>
-          <a:p>
-            <a:pPr algn="ctr"/>
-            <a:endParaRPr lang="en-US"/>
-          </a:p>
-        </p:txBody>
-      </p:sp>
-      <p:sp>
-        <p:nvSpPr>
-          <p:cNvPr id="65" name="Down Arrow 64"/>
-          <p:cNvSpPr/>
-          <p:nvPr/>
-        </p:nvSpPr>
-        <p:spPr>
-          <a:xfrm rot="10800000">
-            <a:off x="7879570" y="753949"/>
-            <a:ext cx="371846" cy="393252"/>
-          </a:xfrm>
-          <a:prstGeom prst="downArrow">
-            <a:avLst/>
-          </a:prstGeom>
-          <a:solidFill>
-            <a:srgbClr val="002060"/>
-          </a:solidFill>
-          <a:ln>
-            <a:solidFill>
-              <a:srgbClr val="0070C0"/>
-            </a:solidFill>
-          </a:ln>
-        </p:spPr>
-        <p:style>
-          <a:lnRef idx="2">
-            <a:schemeClr val="accent1">
-              <a:shade val="50000"/>
-            </a:schemeClr>
-          </a:lnRef>
-          <a:fillRef idx="1">
-            <a:schemeClr val="accent1"/>
-          </a:fillRef>
-          <a:effectRef idx="0">
-            <a:schemeClr val="accent1"/>
-          </a:effectRef>
-          <a:fontRef idx="minor">
-            <a:schemeClr val="lt1"/>
-          </a:fontRef>
-        </p:style>
-        <p:txBody>
-          <a:bodyPr rtlCol="0" anchor="ctr"/>
-          <a:lstStyle/>
-          <a:p>
-            <a:pPr algn="ctr"/>
-            <a:endParaRPr lang="en-US"/>
-          </a:p>
-        </p:txBody>
-      </p:sp>
-      <p:sp>
-        <p:nvSpPr>
           <p:cNvPr id="64" name="Down Arrow 63"/>
           <p:cNvSpPr/>
           <p:nvPr/>
@@ -3123,54 +3064,6 @@
           <a:xfrm rot="10800000">
             <a:off x="7853580" y="1780252"/>
             <a:ext cx="371846" cy="393252"/>
-          </a:xfrm>
-          <a:prstGeom prst="downArrow">
-            <a:avLst/>
-          </a:prstGeom>
-          <a:solidFill>
-            <a:srgbClr val="002060"/>
-          </a:solidFill>
-          <a:ln>
-            <a:solidFill>
-              <a:srgbClr val="0070C0"/>
-            </a:solidFill>
-          </a:ln>
-        </p:spPr>
-        <p:style>
-          <a:lnRef idx="2">
-            <a:schemeClr val="accent1">
-              <a:shade val="50000"/>
-            </a:schemeClr>
-          </a:lnRef>
-          <a:fillRef idx="1">
-            <a:schemeClr val="accent1"/>
-          </a:fillRef>
-          <a:effectRef idx="0">
-            <a:schemeClr val="accent1"/>
-          </a:effectRef>
-          <a:fontRef idx="minor">
-            <a:schemeClr val="lt1"/>
-          </a:fontRef>
-        </p:style>
-        <p:txBody>
-          <a:bodyPr rtlCol="0" anchor="ctr"/>
-          <a:lstStyle/>
-          <a:p>
-            <a:pPr algn="ctr"/>
-            <a:endParaRPr lang="en-US"/>
-          </a:p>
-        </p:txBody>
-      </p:sp>
-      <p:sp>
-        <p:nvSpPr>
-          <p:cNvPr id="71" name="Down Arrow 70"/>
-          <p:cNvSpPr/>
-          <p:nvPr/>
-        </p:nvSpPr>
-        <p:spPr>
-          <a:xfrm rot="10800000">
-            <a:off x="7906412" y="2776092"/>
-            <a:ext cx="227314" cy="810641"/>
           </a:xfrm>
           <a:prstGeom prst="downArrow">
             <a:avLst/>
@@ -4745,42 +4638,6 @@
           </a:p>
         </p:txBody>
       </p:sp>
-      <p:cxnSp>
-        <p:nvCxnSpPr>
-          <p:cNvPr id="20" name="Straight Connector 19"/>
-          <p:cNvCxnSpPr/>
-          <p:nvPr/>
-        </p:nvCxnSpPr>
-        <p:spPr>
-          <a:xfrm flipV="1">
-            <a:off x="900018" y="3017209"/>
-            <a:ext cx="11370365" cy="19878"/>
-          </a:xfrm>
-          <a:prstGeom prst="line">
-            <a:avLst/>
-          </a:prstGeom>
-          <a:ln w="38100">
-            <a:solidFill>
-              <a:schemeClr val="tx1"/>
-            </a:solidFill>
-            <a:prstDash val="dash"/>
-          </a:ln>
-        </p:spPr>
-        <p:style>
-          <a:lnRef idx="1">
-            <a:schemeClr val="accent1"/>
-          </a:lnRef>
-          <a:fillRef idx="0">
-            <a:schemeClr val="accent1"/>
-          </a:fillRef>
-          <a:effectRef idx="0">
-            <a:schemeClr val="accent1"/>
-          </a:effectRef>
-          <a:fontRef idx="minor">
-            <a:schemeClr val="tx1"/>
-          </a:fontRef>
-        </p:style>
-      </p:cxnSp>
       <p:sp>
         <p:nvSpPr>
           <p:cNvPr id="21" name="TextBox 20"/>
@@ -5082,6 +4939,150 @@
           <a:prstGeom prst="downArrow">
             <a:avLst/>
           </a:prstGeom>
+        </p:spPr>
+        <p:style>
+          <a:lnRef idx="2">
+            <a:schemeClr val="accent1">
+              <a:shade val="50000"/>
+            </a:schemeClr>
+          </a:lnRef>
+          <a:fillRef idx="1">
+            <a:schemeClr val="accent1"/>
+          </a:fillRef>
+          <a:effectRef idx="0">
+            <a:schemeClr val="accent1"/>
+          </a:effectRef>
+          <a:fontRef idx="minor">
+            <a:schemeClr val="lt1"/>
+          </a:fontRef>
+        </p:style>
+        <p:txBody>
+          <a:bodyPr rtlCol="0" anchor="ctr"/>
+          <a:lstStyle/>
+          <a:p>
+            <a:pPr algn="ctr"/>
+            <a:endParaRPr lang="en-US"/>
+          </a:p>
+        </p:txBody>
+      </p:sp>
+      <p:sp>
+        <p:nvSpPr>
+          <p:cNvPr id="4" name="Up-Down Arrow 3"/>
+          <p:cNvSpPr/>
+          <p:nvPr/>
+        </p:nvSpPr>
+        <p:spPr>
+          <a:xfrm>
+            <a:off x="7887740" y="2762172"/>
+            <a:ext cx="281107" cy="699254"/>
+          </a:xfrm>
+          <a:prstGeom prst="upDownArrow">
+            <a:avLst/>
+          </a:prstGeom>
+          <a:solidFill>
+            <a:srgbClr val="002060"/>
+          </a:solidFill>
+          <a:ln>
+            <a:solidFill>
+              <a:srgbClr val="0070C0"/>
+            </a:solidFill>
+          </a:ln>
+        </p:spPr>
+        <p:style>
+          <a:lnRef idx="2">
+            <a:schemeClr val="accent1">
+              <a:shade val="50000"/>
+            </a:schemeClr>
+          </a:lnRef>
+          <a:fillRef idx="1">
+            <a:schemeClr val="accent1"/>
+          </a:fillRef>
+          <a:effectRef idx="0">
+            <a:schemeClr val="accent1"/>
+          </a:effectRef>
+          <a:fontRef idx="minor">
+            <a:schemeClr val="lt1"/>
+          </a:fontRef>
+        </p:style>
+        <p:txBody>
+          <a:bodyPr rtlCol="0" anchor="ctr"/>
+          <a:lstStyle/>
+          <a:p>
+            <a:pPr algn="ctr"/>
+            <a:endParaRPr lang="en-US"/>
+          </a:p>
+        </p:txBody>
+      </p:sp>
+      <p:sp>
+        <p:nvSpPr>
+          <p:cNvPr id="53" name="Up-Down Arrow 52"/>
+          <p:cNvSpPr/>
+          <p:nvPr/>
+        </p:nvSpPr>
+        <p:spPr>
+          <a:xfrm>
+            <a:off x="8576803" y="1775726"/>
+            <a:ext cx="320127" cy="1732472"/>
+          </a:xfrm>
+          <a:prstGeom prst="upDownArrow">
+            <a:avLst/>
+          </a:prstGeom>
+          <a:solidFill>
+            <a:srgbClr val="002060"/>
+          </a:solidFill>
+          <a:ln>
+            <a:solidFill>
+              <a:srgbClr val="0070C0"/>
+            </a:solidFill>
+          </a:ln>
+        </p:spPr>
+        <p:style>
+          <a:lnRef idx="2">
+            <a:schemeClr val="accent1">
+              <a:shade val="50000"/>
+            </a:schemeClr>
+          </a:lnRef>
+          <a:fillRef idx="1">
+            <a:schemeClr val="accent1"/>
+          </a:fillRef>
+          <a:effectRef idx="0">
+            <a:schemeClr val="accent1"/>
+          </a:effectRef>
+          <a:fontRef idx="minor">
+            <a:schemeClr val="lt1"/>
+          </a:fontRef>
+        </p:style>
+        <p:txBody>
+          <a:bodyPr rtlCol="0" anchor="ctr"/>
+          <a:lstStyle/>
+          <a:p>
+            <a:pPr algn="ctr"/>
+            <a:endParaRPr lang="en-US"/>
+          </a:p>
+        </p:txBody>
+      </p:sp>
+      <p:sp>
+        <p:nvSpPr>
+          <p:cNvPr id="57" name="Up-Down Arrow 56"/>
+          <p:cNvSpPr/>
+          <p:nvPr/>
+        </p:nvSpPr>
+        <p:spPr>
+          <a:xfrm>
+            <a:off x="9104533" y="775768"/>
+            <a:ext cx="320127" cy="2732430"/>
+          </a:xfrm>
+          <a:prstGeom prst="upDownArrow">
+            <a:avLst/>
+          </a:prstGeom>
+          <a:solidFill>
+            <a:srgbClr val="002060"/>
+          </a:solidFill>
+          <a:ln>
+            <a:solidFill>
+              <a:srgbClr val="0070C0"/>
+            </a:solidFill>
+          </a:ln>
         </p:spPr>
         <p:style>
           <a:lnRef idx="2">

</xml_diff>

<commit_message>
Several changes in the first 3 sections and conclusion. Minor changes to others. Section 4 needs more work based on current discussion.
</commit_message>
<xml_diff>
--- a/arch3.pptx
+++ b/arch3.pptx
@@ -243,7 +243,7 @@
           <a:p>
             <a:fld id="{FEB9F3C6-7DE9-0845-9093-50B66B4BEBAB}" type="datetimeFigureOut">
               <a:rPr lang="en-US" smtClean="0"/>
-              <a:t>8/16/16</a:t>
+              <a:t>8/17/16</a:t>
             </a:fld>
             <a:endParaRPr lang="en-US"/>
           </a:p>
@@ -413,7 +413,7 @@
           <a:p>
             <a:fld id="{FEB9F3C6-7DE9-0845-9093-50B66B4BEBAB}" type="datetimeFigureOut">
               <a:rPr lang="en-US" smtClean="0"/>
-              <a:t>8/16/16</a:t>
+              <a:t>8/17/16</a:t>
             </a:fld>
             <a:endParaRPr lang="en-US"/>
           </a:p>
@@ -593,7 +593,7 @@
           <a:p>
             <a:fld id="{FEB9F3C6-7DE9-0845-9093-50B66B4BEBAB}" type="datetimeFigureOut">
               <a:rPr lang="en-US" smtClean="0"/>
-              <a:t>8/16/16</a:t>
+              <a:t>8/17/16</a:t>
             </a:fld>
             <a:endParaRPr lang="en-US"/>
           </a:p>
@@ -763,7 +763,7 @@
           <a:p>
             <a:fld id="{FEB9F3C6-7DE9-0845-9093-50B66B4BEBAB}" type="datetimeFigureOut">
               <a:rPr lang="en-US" smtClean="0"/>
-              <a:t>8/16/16</a:t>
+              <a:t>8/17/16</a:t>
             </a:fld>
             <a:endParaRPr lang="en-US"/>
           </a:p>
@@ -1009,7 +1009,7 @@
           <a:p>
             <a:fld id="{FEB9F3C6-7DE9-0845-9093-50B66B4BEBAB}" type="datetimeFigureOut">
               <a:rPr lang="en-US" smtClean="0"/>
-              <a:t>8/16/16</a:t>
+              <a:t>8/17/16</a:t>
             </a:fld>
             <a:endParaRPr lang="en-US"/>
           </a:p>
@@ -1241,7 +1241,7 @@
           <a:p>
             <a:fld id="{FEB9F3C6-7DE9-0845-9093-50B66B4BEBAB}" type="datetimeFigureOut">
               <a:rPr lang="en-US" smtClean="0"/>
-              <a:t>8/16/16</a:t>
+              <a:t>8/17/16</a:t>
             </a:fld>
             <a:endParaRPr lang="en-US"/>
           </a:p>
@@ -1608,7 +1608,7 @@
           <a:p>
             <a:fld id="{FEB9F3C6-7DE9-0845-9093-50B66B4BEBAB}" type="datetimeFigureOut">
               <a:rPr lang="en-US" smtClean="0"/>
-              <a:t>8/16/16</a:t>
+              <a:t>8/17/16</a:t>
             </a:fld>
             <a:endParaRPr lang="en-US"/>
           </a:p>
@@ -1726,7 +1726,7 @@
           <a:p>
             <a:fld id="{FEB9F3C6-7DE9-0845-9093-50B66B4BEBAB}" type="datetimeFigureOut">
               <a:rPr lang="en-US" smtClean="0"/>
-              <a:t>8/16/16</a:t>
+              <a:t>8/17/16</a:t>
             </a:fld>
             <a:endParaRPr lang="en-US"/>
           </a:p>
@@ -1821,7 +1821,7 @@
           <a:p>
             <a:fld id="{FEB9F3C6-7DE9-0845-9093-50B66B4BEBAB}" type="datetimeFigureOut">
               <a:rPr lang="en-US" smtClean="0"/>
-              <a:t>8/16/16</a:t>
+              <a:t>8/17/16</a:t>
             </a:fld>
             <a:endParaRPr lang="en-US"/>
           </a:p>
@@ -2098,7 +2098,7 @@
           <a:p>
             <a:fld id="{FEB9F3C6-7DE9-0845-9093-50B66B4BEBAB}" type="datetimeFigureOut">
               <a:rPr lang="en-US" smtClean="0"/>
-              <a:t>8/16/16</a:t>
+              <a:t>8/17/16</a:t>
             </a:fld>
             <a:endParaRPr lang="en-US"/>
           </a:p>
@@ -2351,7 +2351,7 @@
           <a:p>
             <a:fld id="{FEB9F3C6-7DE9-0845-9093-50B66B4BEBAB}" type="datetimeFigureOut">
               <a:rPr lang="en-US" smtClean="0"/>
-              <a:t>8/16/16</a:t>
+              <a:t>8/17/16</a:t>
             </a:fld>
             <a:endParaRPr lang="en-US"/>
           </a:p>
@@ -2564,7 +2564,7 @@
           <a:p>
             <a:fld id="{FEB9F3C6-7DE9-0845-9093-50B66B4BEBAB}" type="datetimeFigureOut">
               <a:rPr lang="en-US" smtClean="0"/>
-              <a:t>8/16/16</a:t>
+              <a:t>8/17/16</a:t>
             </a:fld>
             <a:endParaRPr lang="en-US"/>
           </a:p>
@@ -3110,8 +3110,8 @@
         </p:nvSpPr>
         <p:spPr>
           <a:xfrm>
-            <a:off x="3161486" y="5398507"/>
-            <a:ext cx="1264660" cy="371959"/>
+            <a:off x="3025807" y="5398507"/>
+            <a:ext cx="1400339" cy="371959"/>
           </a:xfrm>
           <a:prstGeom prst="leftRightArrow">
             <a:avLst/>
@@ -3392,205 +3392,6 @@
       </p:sp>
       <p:grpSp>
         <p:nvGrpSpPr>
-          <p:cNvPr id="2" name="Group 1"/>
-          <p:cNvGrpSpPr/>
-          <p:nvPr/>
-        </p:nvGrpSpPr>
-        <p:grpSpPr>
-          <a:xfrm>
-            <a:off x="1564608" y="4662597"/>
-            <a:ext cx="2129318" cy="1444166"/>
-            <a:chOff x="2170191" y="4166438"/>
-            <a:chExt cx="2448732" cy="1472339"/>
-          </a:xfrm>
-        </p:grpSpPr>
-        <p:sp>
-          <p:nvSpPr>
-            <p:cNvPr id="7" name="Cloud 6"/>
-            <p:cNvSpPr/>
-            <p:nvPr/>
-          </p:nvSpPr>
-          <p:spPr>
-            <a:xfrm>
-              <a:off x="2170191" y="4166438"/>
-              <a:ext cx="2448732" cy="1472339"/>
-            </a:xfrm>
-            <a:prstGeom prst="cloud">
-              <a:avLst/>
-            </a:prstGeom>
-          </p:spPr>
-          <p:style>
-            <a:lnRef idx="2">
-              <a:schemeClr val="accent1">
-                <a:shade val="50000"/>
-              </a:schemeClr>
-            </a:lnRef>
-            <a:fillRef idx="1">
-              <a:schemeClr val="accent1"/>
-            </a:fillRef>
-            <a:effectRef idx="0">
-              <a:schemeClr val="accent1"/>
-            </a:effectRef>
-            <a:fontRef idx="minor">
-              <a:schemeClr val="lt1"/>
-            </a:fontRef>
-          </p:style>
-          <p:txBody>
-            <a:bodyPr rtlCol="0" anchor="ctr"/>
-            <a:lstStyle/>
-            <a:p>
-              <a:pPr algn="ctr"/>
-              <a:endParaRPr lang="en-US" dirty="0" smtClean="0"/>
-            </a:p>
-            <a:p>
-              <a:pPr algn="ctr"/>
-              <a:endParaRPr lang="en-US" dirty="0"/>
-            </a:p>
-            <a:p>
-              <a:pPr algn="ctr"/>
-              <a:endParaRPr lang="en-US" dirty="0" smtClean="0"/>
-            </a:p>
-            <a:p>
-              <a:pPr algn="ctr"/>
-              <a:r>
-                <a:rPr lang="en-US" dirty="0" smtClean="0"/>
-                <a:t>Silo 1</a:t>
-              </a:r>
-            </a:p>
-          </p:txBody>
-        </p:sp>
-        <p:sp>
-          <p:nvSpPr>
-            <p:cNvPr id="10" name="Can 9"/>
-            <p:cNvSpPr/>
-            <p:nvPr/>
-          </p:nvSpPr>
-          <p:spPr>
-            <a:xfrm>
-              <a:off x="2797407" y="4497067"/>
-              <a:ext cx="387458" cy="542441"/>
-            </a:xfrm>
-            <a:prstGeom prst="can">
-              <a:avLst/>
-            </a:prstGeom>
-            <a:solidFill>
-              <a:schemeClr val="accent2"/>
-            </a:solidFill>
-          </p:spPr>
-          <p:style>
-            <a:lnRef idx="2">
-              <a:schemeClr val="accent1">
-                <a:shade val="50000"/>
-              </a:schemeClr>
-            </a:lnRef>
-            <a:fillRef idx="1">
-              <a:schemeClr val="accent1"/>
-            </a:fillRef>
-            <a:effectRef idx="0">
-              <a:schemeClr val="accent1"/>
-            </a:effectRef>
-            <a:fontRef idx="minor">
-              <a:schemeClr val="lt1"/>
-            </a:fontRef>
-          </p:style>
-          <p:txBody>
-            <a:bodyPr rtlCol="0" anchor="ctr"/>
-            <a:lstStyle/>
-            <a:p>
-              <a:pPr algn="ctr"/>
-              <a:endParaRPr lang="en-US"/>
-            </a:p>
-          </p:txBody>
-        </p:sp>
-        <p:sp>
-          <p:nvSpPr>
-            <p:cNvPr id="11" name="Can 10"/>
-            <p:cNvSpPr/>
-            <p:nvPr/>
-          </p:nvSpPr>
-          <p:spPr>
-            <a:xfrm>
-              <a:off x="3275270" y="4525482"/>
-              <a:ext cx="387458" cy="542441"/>
-            </a:xfrm>
-            <a:prstGeom prst="can">
-              <a:avLst/>
-            </a:prstGeom>
-            <a:solidFill>
-              <a:schemeClr val="accent2"/>
-            </a:solidFill>
-          </p:spPr>
-          <p:style>
-            <a:lnRef idx="2">
-              <a:schemeClr val="accent1">
-                <a:shade val="50000"/>
-              </a:schemeClr>
-            </a:lnRef>
-            <a:fillRef idx="1">
-              <a:schemeClr val="accent1"/>
-            </a:fillRef>
-            <a:effectRef idx="0">
-              <a:schemeClr val="accent1"/>
-            </a:effectRef>
-            <a:fontRef idx="minor">
-              <a:schemeClr val="lt1"/>
-            </a:fontRef>
-          </p:style>
-          <p:txBody>
-            <a:bodyPr rtlCol="0" anchor="ctr"/>
-            <a:lstStyle/>
-            <a:p>
-              <a:pPr algn="ctr"/>
-              <a:endParaRPr lang="en-US"/>
-            </a:p>
-          </p:txBody>
-        </p:sp>
-        <p:sp>
-          <p:nvSpPr>
-            <p:cNvPr id="12" name="Can 11"/>
-            <p:cNvSpPr/>
-            <p:nvPr/>
-          </p:nvSpPr>
-          <p:spPr>
-            <a:xfrm>
-              <a:off x="3833214" y="4571975"/>
-              <a:ext cx="387458" cy="542441"/>
-            </a:xfrm>
-            <a:prstGeom prst="can">
-              <a:avLst/>
-            </a:prstGeom>
-            <a:solidFill>
-              <a:schemeClr val="accent2"/>
-            </a:solidFill>
-          </p:spPr>
-          <p:style>
-            <a:lnRef idx="2">
-              <a:schemeClr val="accent1">
-                <a:shade val="50000"/>
-              </a:schemeClr>
-            </a:lnRef>
-            <a:fillRef idx="1">
-              <a:schemeClr val="accent1"/>
-            </a:fillRef>
-            <a:effectRef idx="0">
-              <a:schemeClr val="accent1"/>
-            </a:effectRef>
-            <a:fontRef idx="minor">
-              <a:schemeClr val="lt1"/>
-            </a:fontRef>
-          </p:style>
-          <p:txBody>
-            <a:bodyPr rtlCol="0" anchor="ctr"/>
-            <a:lstStyle/>
-            <a:p>
-              <a:pPr algn="ctr"/>
-              <a:endParaRPr lang="en-US"/>
-            </a:p>
-          </p:txBody>
-        </p:sp>
-      </p:grpSp>
-      <p:grpSp>
-        <p:nvGrpSpPr>
           <p:cNvPr id="3" name="Group 2"/>
           <p:cNvGrpSpPr/>
           <p:nvPr/>
@@ -3617,6 +3418,12 @@
             <a:prstGeom prst="cloud">
               <a:avLst/>
             </a:prstGeom>
+            <a:solidFill>
+              <a:schemeClr val="accent1">
+                <a:lumMod val="60000"/>
+                <a:lumOff val="40000"/>
+              </a:schemeClr>
+            </a:solidFill>
           </p:spPr>
           <p:style>
             <a:lnRef idx="2">
@@ -3652,10 +3459,10 @@
             <a:p>
               <a:pPr algn="ctr"/>
               <a:r>
-                <a:rPr lang="en-US" dirty="0" smtClean="0"/>
+                <a:rPr lang="en-US" sz="2000" b="1" dirty="0" smtClean="0"/>
                 <a:t>Silo 2</a:t>
               </a:r>
-              <a:endParaRPr lang="en-US" dirty="0"/>
+              <a:endParaRPr lang="en-US" sz="2000" b="1" dirty="0"/>
             </a:p>
           </p:txBody>
         </p:sp>
@@ -3710,7 +3517,7 @@
           </p:nvSpPr>
           <p:spPr>
             <a:xfrm>
-              <a:off x="6307779" y="4556728"/>
+              <a:off x="6391739" y="4556728"/>
               <a:ext cx="387458" cy="542441"/>
             </a:xfrm>
             <a:prstGeom prst="can">
@@ -3753,7 +3560,7 @@
           </p:nvSpPr>
           <p:spPr>
             <a:xfrm>
-              <a:off x="6865723" y="4603221"/>
+              <a:off x="6949684" y="4537435"/>
               <a:ext cx="387458" cy="542441"/>
             </a:xfrm>
             <a:prstGeom prst="can">
@@ -3797,12 +3604,18 @@
         </p:nvSpPr>
         <p:spPr>
           <a:xfrm>
-            <a:off x="7008612" y="3341715"/>
-            <a:ext cx="2526224" cy="2810938"/>
+            <a:off x="7008612" y="3461370"/>
+            <a:ext cx="2526224" cy="2568574"/>
           </a:xfrm>
           <a:prstGeom prst="can">
             <a:avLst/>
           </a:prstGeom>
+          <a:solidFill>
+            <a:schemeClr val="accent1">
+              <a:lumMod val="60000"/>
+              <a:lumOff val="40000"/>
+            </a:schemeClr>
+          </a:solidFill>
         </p:spPr>
         <p:style>
           <a:lnRef idx="2">
@@ -3825,9 +3638,17 @@
           <a:lstStyle/>
           <a:p>
             <a:pPr algn="ctr"/>
-            <a:r>
-              <a:rPr lang="en-US" sz="2400" dirty="0" smtClean="0"/>
-              <a:t>Linkage Graph</a:t>
+            <a:endParaRPr lang="en-US" sz="2400" b="1" dirty="0" smtClean="0"/>
+          </a:p>
+          <a:p>
+            <a:pPr algn="ctr"/>
+            <a:r>
+              <a:rPr lang="en-US" sz="2400" b="1" dirty="0" smtClean="0"/>
+              <a:t>Linkage </a:t>
+            </a:r>
+            <a:r>
+              <a:rPr lang="en-US" sz="2400" b="1" dirty="0" smtClean="0"/>
+              <a:t>Graph</a:t>
             </a:r>
           </a:p>
           <a:p>
@@ -4283,12 +4104,18 @@
         </p:nvSpPr>
         <p:spPr>
           <a:xfrm>
-            <a:off x="2184399" y="6146181"/>
-            <a:ext cx="7240261" cy="431171"/>
+            <a:off x="2184399" y="6106425"/>
+            <a:ext cx="7340944" cy="503690"/>
           </a:xfrm>
           <a:prstGeom prst="rect">
             <a:avLst/>
           </a:prstGeom>
+          <a:solidFill>
+            <a:schemeClr val="accent1">
+              <a:lumMod val="60000"/>
+              <a:lumOff val="40000"/>
+            </a:schemeClr>
+          </a:solidFill>
           <a:ln>
             <a:noFill/>
           </a:ln>
@@ -4315,26 +4142,26 @@
           <a:p>
             <a:pPr algn="ctr"/>
             <a:r>
-              <a:rPr lang="en-US" sz="2400" dirty="0" err="1" smtClean="0"/>
+              <a:rPr lang="en-US" sz="2400" b="1" dirty="0" err="1" smtClean="0"/>
               <a:t>Polystore</a:t>
             </a:r>
             <a:r>
-              <a:rPr lang="en-US" sz="2400" dirty="0"/>
+              <a:rPr lang="en-US" sz="2400" b="1" dirty="0"/>
               <a:t> </a:t>
             </a:r>
             <a:r>
-              <a:rPr lang="en-US" sz="2400" dirty="0" smtClean="0"/>
+              <a:rPr lang="en-US" sz="2400" b="1" dirty="0" smtClean="0"/>
               <a:t>(</a:t>
             </a:r>
             <a:r>
-              <a:rPr lang="en-US" sz="2400" dirty="0" err="1" smtClean="0"/>
+              <a:rPr lang="en-US" sz="2400" b="1" dirty="0" err="1" smtClean="0"/>
               <a:t>BigDawg</a:t>
             </a:r>
             <a:r>
-              <a:rPr lang="en-US" sz="2400" dirty="0" smtClean="0"/>
+              <a:rPr lang="en-US" sz="2400" b="1" dirty="0" smtClean="0"/>
               <a:t>)</a:t>
             </a:r>
-            <a:endParaRPr lang="en-US" sz="2400" dirty="0"/>
+            <a:endParaRPr lang="en-US" sz="2400" b="1" dirty="0"/>
           </a:p>
         </p:txBody>
       </p:sp>
@@ -4392,6 +4219,12 @@
           <a:prstGeom prst="roundRect">
             <a:avLst/>
           </a:prstGeom>
+          <a:solidFill>
+            <a:schemeClr val="accent1">
+              <a:lumMod val="60000"/>
+              <a:lumOff val="40000"/>
+            </a:schemeClr>
+          </a:solidFill>
           <a:ln>
             <a:solidFill>
               <a:schemeClr val="accent5"/>
@@ -4420,10 +4253,10 @@
           <a:p>
             <a:pPr algn="ctr"/>
             <a:r>
-              <a:rPr lang="en-US" dirty="0" smtClean="0"/>
+              <a:rPr lang="en-US" sz="2000" b="1" dirty="0" smtClean="0"/>
               <a:t>Data Profiler</a:t>
             </a:r>
-            <a:endParaRPr lang="en-US" dirty="0"/>
+            <a:endParaRPr lang="en-US" sz="2000" b="1" dirty="0"/>
           </a:p>
         </p:txBody>
       </p:sp>
@@ -4441,6 +4274,12 @@
           <a:prstGeom prst="roundRect">
             <a:avLst/>
           </a:prstGeom>
+          <a:solidFill>
+            <a:schemeClr val="accent1">
+              <a:lumMod val="60000"/>
+              <a:lumOff val="40000"/>
+            </a:schemeClr>
+          </a:solidFill>
           <a:ln>
             <a:solidFill>
               <a:schemeClr val="accent5"/>
@@ -4469,10 +4308,10 @@
           <a:p>
             <a:pPr algn="ctr"/>
             <a:r>
-              <a:rPr lang="en-US" dirty="0" smtClean="0"/>
+              <a:rPr lang="en-US" b="1" dirty="0" smtClean="0"/>
               <a:t>Graph Builder</a:t>
             </a:r>
-            <a:endParaRPr lang="en-US" dirty="0"/>
+            <a:endParaRPr lang="en-US" b="1" dirty="0"/>
           </a:p>
         </p:txBody>
       </p:sp>
@@ -4484,12 +4323,18 @@
         </p:nvSpPr>
         <p:spPr>
           <a:xfrm>
-            <a:off x="9722268" y="2716488"/>
-            <a:ext cx="1640738" cy="603504"/>
+            <a:off x="9722268" y="2637183"/>
+            <a:ext cx="1640738" cy="682809"/>
           </a:xfrm>
           <a:prstGeom prst="roundRect">
             <a:avLst/>
           </a:prstGeom>
+          <a:solidFill>
+            <a:schemeClr val="accent1">
+              <a:lumMod val="60000"/>
+              <a:lumOff val="40000"/>
+            </a:schemeClr>
+          </a:solidFill>
           <a:ln>
             <a:solidFill>
               <a:schemeClr val="accent5"/>
@@ -4518,10 +4363,10 @@
           <a:p>
             <a:pPr algn="ctr"/>
             <a:r>
-              <a:rPr lang="en-US" dirty="0" smtClean="0"/>
+              <a:rPr lang="en-US" sz="2000" b="1" dirty="0"/>
               <a:t>Workflow Orchestrator</a:t>
             </a:r>
-            <a:endParaRPr lang="en-US" dirty="0"/>
+            <a:endParaRPr lang="en-US" sz="2000" b="1" dirty="0"/>
           </a:p>
         </p:txBody>
       </p:sp>
@@ -4539,6 +4384,12 @@
           <a:prstGeom prst="roundRect">
             <a:avLst/>
           </a:prstGeom>
+          <a:solidFill>
+            <a:schemeClr val="accent1">
+              <a:lumMod val="60000"/>
+              <a:lumOff val="40000"/>
+            </a:schemeClr>
+          </a:solidFill>
           <a:ln>
             <a:solidFill>
               <a:schemeClr val="accent5"/>
@@ -4567,10 +4418,10 @@
           <a:p>
             <a:pPr algn="ctr"/>
             <a:r>
-              <a:rPr lang="en-US" dirty="0" smtClean="0"/>
+              <a:rPr lang="en-US" sz="2000" b="1" dirty="0" smtClean="0"/>
               <a:t>Cleanliness Estimator</a:t>
             </a:r>
-            <a:endParaRPr lang="en-US" dirty="0"/>
+            <a:endParaRPr lang="en-US" sz="2000" b="1" dirty="0"/>
           </a:p>
         </p:txBody>
       </p:sp>
@@ -4646,8 +4497,8 @@
         </p:nvSpPr>
         <p:spPr>
           <a:xfrm>
-            <a:off x="914400" y="1403129"/>
-            <a:ext cx="1157464" cy="523220"/>
+            <a:off x="648900" y="1373269"/>
+            <a:ext cx="1434571" cy="523220"/>
           </a:xfrm>
           <a:prstGeom prst="rect">
             <a:avLst/>
@@ -4722,6 +4573,12 @@
           <a:prstGeom prst="roundRect">
             <a:avLst/>
           </a:prstGeom>
+          <a:solidFill>
+            <a:schemeClr val="accent1">
+              <a:lumMod val="60000"/>
+              <a:lumOff val="40000"/>
+            </a:schemeClr>
+          </a:solidFill>
           <a:ln>
             <a:solidFill>
               <a:schemeClr val="accent5"/>
@@ -4750,10 +4607,10 @@
           <a:p>
             <a:pPr algn="ctr"/>
             <a:r>
-              <a:rPr lang="en-US" dirty="0" smtClean="0"/>
+              <a:rPr lang="en-US" sz="2000" b="1" dirty="0" smtClean="0"/>
               <a:t>Join Path Selection</a:t>
             </a:r>
-            <a:endParaRPr lang="en-US" dirty="0"/>
+            <a:endParaRPr lang="en-US" sz="2000" b="1" dirty="0"/>
           </a:p>
         </p:txBody>
       </p:sp>
@@ -4766,11 +4623,17 @@
         <p:spPr>
           <a:xfrm>
             <a:off x="7308641" y="2105123"/>
-            <a:ext cx="1242043" cy="662676"/>
+            <a:ext cx="1375476" cy="662676"/>
           </a:xfrm>
           <a:prstGeom prst="roundRect">
             <a:avLst/>
           </a:prstGeom>
+          <a:solidFill>
+            <a:schemeClr val="accent1">
+              <a:lumMod val="60000"/>
+              <a:lumOff val="40000"/>
+            </a:schemeClr>
+          </a:solidFill>
           <a:ln>
             <a:solidFill>
               <a:schemeClr val="accent5"/>
@@ -4799,10 +4662,10 @@
           <a:p>
             <a:pPr algn="ctr"/>
             <a:r>
-              <a:rPr lang="en-US" dirty="0" smtClean="0"/>
+              <a:rPr lang="en-US" sz="2000" b="1" dirty="0" smtClean="0"/>
               <a:t>Data Discovery</a:t>
             </a:r>
-            <a:endParaRPr lang="en-US" dirty="0"/>
+            <a:endParaRPr lang="en-US" sz="2000" b="1" dirty="0"/>
           </a:p>
         </p:txBody>
       </p:sp>
@@ -4820,6 +4683,12 @@
           <a:prstGeom prst="roundRect">
             <a:avLst/>
           </a:prstGeom>
+          <a:solidFill>
+            <a:schemeClr val="accent1">
+              <a:lumMod val="60000"/>
+              <a:lumOff val="40000"/>
+            </a:schemeClr>
+          </a:solidFill>
           <a:ln>
             <a:solidFill>
               <a:schemeClr val="accent5"/>
@@ -4848,10 +4717,10 @@
           <a:p>
             <a:pPr algn="ctr"/>
             <a:r>
-              <a:rPr lang="en-US" dirty="0" smtClean="0"/>
+              <a:rPr lang="en-US" sz="2000" b="1" dirty="0" smtClean="0"/>
               <a:t>Clean Data in View</a:t>
             </a:r>
-            <a:endParaRPr lang="en-US" dirty="0"/>
+            <a:endParaRPr lang="en-US" sz="2000" b="1" dirty="0"/>
           </a:p>
         </p:txBody>
       </p:sp>
@@ -4863,7 +4732,7 @@
         </p:nvSpPr>
         <p:spPr>
           <a:xfrm>
-            <a:off x="728071" y="4456707"/>
+            <a:off x="648901" y="4255098"/>
             <a:ext cx="1157464" cy="461665"/>
           </a:xfrm>
           <a:prstGeom prst="rect">
@@ -5021,7 +4890,7 @@
         </p:nvSpPr>
         <p:spPr>
           <a:xfrm>
-            <a:off x="8576803" y="1775726"/>
+            <a:off x="8696071" y="1775726"/>
             <a:ext cx="320127" cy="1732472"/>
           </a:xfrm>
           <a:prstGeom prst="upDownArrow">
@@ -5070,7 +4939,7 @@
         <p:spPr>
           <a:xfrm>
             <a:off x="9104533" y="775768"/>
-            <a:ext cx="320127" cy="2732430"/>
+            <a:ext cx="320127" cy="2858350"/>
           </a:xfrm>
           <a:prstGeom prst="upDownArrow">
             <a:avLst/>
@@ -5109,6 +4978,216 @@
           </a:p>
         </p:txBody>
       </p:sp>
+      <p:grpSp>
+        <p:nvGrpSpPr>
+          <p:cNvPr id="52" name="Group 51"/>
+          <p:cNvGrpSpPr/>
+          <p:nvPr/>
+        </p:nvGrpSpPr>
+        <p:grpSpPr>
+          <a:xfrm>
+            <a:off x="1120875" y="4610747"/>
+            <a:ext cx="2449817" cy="1482933"/>
+            <a:chOff x="5375289" y="4166438"/>
+            <a:chExt cx="2586873" cy="1472339"/>
+          </a:xfrm>
+        </p:grpSpPr>
+        <p:sp>
+          <p:nvSpPr>
+            <p:cNvPr id="58" name="Cloud 57"/>
+            <p:cNvSpPr/>
+            <p:nvPr/>
+          </p:nvSpPr>
+          <p:spPr>
+            <a:xfrm>
+              <a:off x="5375289" y="4166438"/>
+              <a:ext cx="2586873" cy="1472339"/>
+            </a:xfrm>
+            <a:prstGeom prst="cloud">
+              <a:avLst/>
+            </a:prstGeom>
+            <a:solidFill>
+              <a:schemeClr val="accent1">
+                <a:lumMod val="60000"/>
+                <a:lumOff val="40000"/>
+              </a:schemeClr>
+            </a:solidFill>
+          </p:spPr>
+          <p:style>
+            <a:lnRef idx="2">
+              <a:schemeClr val="accent1">
+                <a:shade val="50000"/>
+              </a:schemeClr>
+            </a:lnRef>
+            <a:fillRef idx="1">
+              <a:schemeClr val="accent1"/>
+            </a:fillRef>
+            <a:effectRef idx="0">
+              <a:schemeClr val="accent1"/>
+            </a:effectRef>
+            <a:fontRef idx="minor">
+              <a:schemeClr val="lt1"/>
+            </a:fontRef>
+          </p:style>
+          <p:txBody>
+            <a:bodyPr rtlCol="0" anchor="ctr"/>
+            <a:lstStyle/>
+            <a:p>
+              <a:pPr algn="ctr"/>
+              <a:endParaRPr lang="en-US" dirty="0"/>
+            </a:p>
+            <a:p>
+              <a:pPr algn="ctr"/>
+              <a:endParaRPr lang="en-US" dirty="0" smtClean="0"/>
+            </a:p>
+            <a:p>
+              <a:pPr algn="ctr"/>
+              <a:endParaRPr lang="en-US" dirty="0"/>
+            </a:p>
+            <a:p>
+              <a:pPr algn="ctr"/>
+              <a:r>
+                <a:rPr lang="en-US" sz="2000" b="1" dirty="0" smtClean="0"/>
+                <a:t>Silo </a:t>
+              </a:r>
+              <a:r>
+                <a:rPr lang="en-US" sz="2000" b="1" dirty="0" smtClean="0"/>
+                <a:t>1</a:t>
+              </a:r>
+              <a:endParaRPr lang="en-US" sz="2000" b="1" dirty="0"/>
+            </a:p>
+          </p:txBody>
+        </p:sp>
+        <p:sp>
+          <p:nvSpPr>
+            <p:cNvPr id="66" name="Can 65"/>
+            <p:cNvSpPr/>
+            <p:nvPr/>
+          </p:nvSpPr>
+          <p:spPr>
+            <a:xfrm>
+              <a:off x="5829916" y="4528313"/>
+              <a:ext cx="387458" cy="542441"/>
+            </a:xfrm>
+            <a:prstGeom prst="can">
+              <a:avLst/>
+            </a:prstGeom>
+            <a:solidFill>
+              <a:schemeClr val="accent2"/>
+            </a:solidFill>
+          </p:spPr>
+          <p:style>
+            <a:lnRef idx="2">
+              <a:schemeClr val="accent1">
+                <a:shade val="50000"/>
+              </a:schemeClr>
+            </a:lnRef>
+            <a:fillRef idx="1">
+              <a:schemeClr val="accent1"/>
+            </a:fillRef>
+            <a:effectRef idx="0">
+              <a:schemeClr val="accent1"/>
+            </a:effectRef>
+            <a:fontRef idx="minor">
+              <a:schemeClr val="lt1"/>
+            </a:fontRef>
+          </p:style>
+          <p:txBody>
+            <a:bodyPr rtlCol="0" anchor="ctr"/>
+            <a:lstStyle/>
+            <a:p>
+              <a:pPr algn="ctr"/>
+              <a:endParaRPr lang="en-US"/>
+            </a:p>
+          </p:txBody>
+        </p:sp>
+        <p:sp>
+          <p:nvSpPr>
+            <p:cNvPr id="71" name="Can 70"/>
+            <p:cNvSpPr/>
+            <p:nvPr/>
+          </p:nvSpPr>
+          <p:spPr>
+            <a:xfrm>
+              <a:off x="6391739" y="4556728"/>
+              <a:ext cx="387458" cy="542441"/>
+            </a:xfrm>
+            <a:prstGeom prst="can">
+              <a:avLst/>
+            </a:prstGeom>
+            <a:solidFill>
+              <a:schemeClr val="accent2"/>
+            </a:solidFill>
+          </p:spPr>
+          <p:style>
+            <a:lnRef idx="2">
+              <a:schemeClr val="accent1">
+                <a:shade val="50000"/>
+              </a:schemeClr>
+            </a:lnRef>
+            <a:fillRef idx="1">
+              <a:schemeClr val="accent1"/>
+            </a:fillRef>
+            <a:effectRef idx="0">
+              <a:schemeClr val="accent1"/>
+            </a:effectRef>
+            <a:fontRef idx="minor">
+              <a:schemeClr val="lt1"/>
+            </a:fontRef>
+          </p:style>
+          <p:txBody>
+            <a:bodyPr rtlCol="0" anchor="ctr"/>
+            <a:lstStyle/>
+            <a:p>
+              <a:pPr algn="ctr"/>
+              <a:endParaRPr lang="en-US"/>
+            </a:p>
+          </p:txBody>
+        </p:sp>
+        <p:sp>
+          <p:nvSpPr>
+            <p:cNvPr id="72" name="Can 71"/>
+            <p:cNvSpPr/>
+            <p:nvPr/>
+          </p:nvSpPr>
+          <p:spPr>
+            <a:xfrm>
+              <a:off x="6949684" y="4537435"/>
+              <a:ext cx="387458" cy="542441"/>
+            </a:xfrm>
+            <a:prstGeom prst="can">
+              <a:avLst/>
+            </a:prstGeom>
+            <a:solidFill>
+              <a:schemeClr val="accent2"/>
+            </a:solidFill>
+          </p:spPr>
+          <p:style>
+            <a:lnRef idx="2">
+              <a:schemeClr val="accent1">
+                <a:shade val="50000"/>
+              </a:schemeClr>
+            </a:lnRef>
+            <a:fillRef idx="1">
+              <a:schemeClr val="accent1"/>
+            </a:fillRef>
+            <a:effectRef idx="0">
+              <a:schemeClr val="accent1"/>
+            </a:effectRef>
+            <a:fontRef idx="minor">
+              <a:schemeClr val="lt1"/>
+            </a:fontRef>
+          </p:style>
+          <p:txBody>
+            <a:bodyPr rtlCol="0" anchor="ctr"/>
+            <a:lstStyle/>
+            <a:p>
+              <a:pPr algn="ctr"/>
+              <a:endParaRPr lang="en-US"/>
+            </a:p>
+          </p:txBody>
+        </p:sp>
+      </p:grpSp>
     </p:spTree>
     <p:extLst>
       <p:ext uri="{BB962C8B-B14F-4D97-AF65-F5344CB8AC3E}">

</xml_diff>